<commit_message>
added the bug page
</commit_message>
<xml_diff>
--- a/testing javascript isnt magic.pptx
+++ b/testing javascript isnt magic.pptx
@@ -3372,67 +3372,24 @@
       </p:grpSpPr>
       <p:pic>
         <p:nvPicPr>
-          <p:cNvPr id="163" name="bugs-on-the-wall.png"/>
+          <p:cNvPr id="163" name="pastedImage.png"/>
           <p:cNvPicPr>
             <a:picLocks noChangeAspect="1"/>
           </p:cNvPicPr>
-          <p:nvPr>
-            <p:ph type="pic" idx="13"/>
-          </p:nvPr>
+          <p:nvPr/>
         </p:nvPicPr>
         <p:blipFill>
           <a:blip r:embed="rId2">
             <a:extLst/>
           </a:blip>
-          <a:srcRect l="0" t="0" r="0" b="0"/>
           <a:stretch>
             <a:fillRect/>
           </a:stretch>
         </p:blipFill>
         <p:spPr>
           <a:xfrm>
-            <a:off x="870396" y="4146739"/>
-            <a:ext cx="12008547" cy="4597022"/>
-          </a:xfrm>
-          <a:prstGeom prst="rect">
-            <a:avLst/>
-          </a:prstGeom>
-        </p:spPr>
-      </p:pic>
-      <p:sp>
-        <p:nvSpPr>
-          <p:cNvPr id="164" name="Shape 164"/>
-          <p:cNvSpPr/>
-          <p:nvPr>
-            <p:ph type="title"/>
-          </p:nvPr>
-        </p:nvSpPr>
-        <p:spPr>
-          <a:prstGeom prst="rect">
-            <a:avLst/>
-          </a:prstGeom>
-        </p:spPr>
-        <p:txBody>
-          <a:bodyPr/>
-          <a:lstStyle/>
-          <a:p>
-            <a:pPr/>
-            <a:r>
-              <a:t>Why do we really test?</a:t>
-            </a:r>
-          </a:p>
-        </p:txBody>
-      </p:sp>
-      <p:sp>
-        <p:nvSpPr>
-          <p:cNvPr id="165" name="Shape 165"/>
-          <p:cNvSpPr/>
-          <p:nvPr/>
-        </p:nvSpPr>
-        <p:spPr>
-          <a:xfrm>
-            <a:off x="3028594" y="2540000"/>
-            <a:ext cx="6947612" cy="812801"/>
+            <a:off x="406400" y="609600"/>
+            <a:ext cx="12192000" cy="8534400"/>
           </a:xfrm>
           <a:prstGeom prst="rect">
             <a:avLst/>
@@ -3440,29 +3397,8 @@
           <a:ln w="12700">
             <a:miter lim="400000"/>
           </a:ln>
-          <a:extLst>
-            <a:ext uri="{C572A759-6A51-4108-AA02-DFA0A04FC94B}">
-              <ma14:wrappingTextBoxFlag xmlns:ma14="http://schemas.microsoft.com/office/mac/drawingml/2011/main" val="1"/>
-            </a:ext>
-          </a:extLst>
-        </p:spPr>
-        <p:txBody>
-          <a:bodyPr wrap="none" lIns="50800" tIns="50800" rIns="50800" bIns="50800" anchor="ctr">
-            <a:spAutoFit/>
-          </a:bodyPr>
-          <a:lstStyle>
-            <a:lvl1pPr>
-              <a:defRPr sz="4700"/>
-            </a:lvl1pPr>
-          </a:lstStyle>
-          <a:p>
-            <a:pPr/>
-            <a:r>
-              <a:t>Speed is just a test away!</a:t>
-            </a:r>
-          </a:p>
-        </p:txBody>
-      </p:sp>
+        </p:spPr>
+      </p:pic>
     </p:spTree>
   </p:cSld>
   <p:clrMapOvr>
@@ -3491,7 +3427,7 @@
       </p:grpSpPr>
       <p:sp>
         <p:nvSpPr>
-          <p:cNvPr id="167" name="Shape 167"/>
+          <p:cNvPr id="165" name="Shape 165"/>
           <p:cNvSpPr/>
           <p:nvPr>
             <p:ph type="title"/>
@@ -3515,7 +3451,7 @@
       </p:sp>
       <p:sp>
         <p:nvSpPr>
-          <p:cNvPr id="168" name="Shape 168"/>
+          <p:cNvPr id="166" name="Shape 166"/>
           <p:cNvSpPr/>
           <p:nvPr/>
         </p:nvSpPr>
@@ -3555,7 +3491,7 @@
       </p:sp>
       <p:sp>
         <p:nvSpPr>
-          <p:cNvPr id="169" name="Shape 169"/>
+          <p:cNvPr id="167" name="Shape 167"/>
           <p:cNvSpPr/>
           <p:nvPr/>
         </p:nvSpPr>
@@ -3617,7 +3553,7 @@
       </p:grpSpPr>
       <p:sp>
         <p:nvSpPr>
-          <p:cNvPr id="171" name="Shape 171"/>
+          <p:cNvPr id="169" name="Shape 169"/>
           <p:cNvSpPr/>
           <p:nvPr>
             <p:ph type="title"/>
@@ -3645,7 +3581,7 @@
       </p:sp>
       <p:sp>
         <p:nvSpPr>
-          <p:cNvPr id="172" name="Shape 172"/>
+          <p:cNvPr id="170" name="Shape 170"/>
           <p:cNvSpPr/>
           <p:nvPr>
             <p:ph type="body" sz="half" idx="1"/>
@@ -3691,7 +3627,7 @@
       </p:sp>
       <p:sp>
         <p:nvSpPr>
-          <p:cNvPr id="173" name="Shape 173"/>
+          <p:cNvPr id="171" name="Shape 171"/>
           <p:cNvSpPr/>
           <p:nvPr/>
         </p:nvSpPr>
@@ -3727,7 +3663,7 @@
       </p:sp>
       <p:pic>
         <p:nvPicPr>
-          <p:cNvPr id="174" name="bug-fix-costs.jpg"/>
+          <p:cNvPr id="172" name="bug-fix-costs.jpg"/>
           <p:cNvPicPr>
             <a:picLocks noChangeAspect="1"/>
           </p:cNvPicPr>
@@ -3782,7 +3718,7 @@
       </p:grpSpPr>
       <p:sp>
         <p:nvSpPr>
-          <p:cNvPr id="176" name="Shape 176"/>
+          <p:cNvPr id="174" name="Shape 174"/>
           <p:cNvSpPr/>
           <p:nvPr>
             <p:ph type="title"/>
@@ -3810,7 +3746,7 @@
       </p:sp>
       <p:sp>
         <p:nvSpPr>
-          <p:cNvPr id="177" name="Shape 177"/>
+          <p:cNvPr id="175" name="Shape 175"/>
           <p:cNvSpPr/>
           <p:nvPr/>
         </p:nvSpPr>
@@ -3855,7 +3791,7 @@
       </p:sp>
       <p:pic>
         <p:nvPicPr>
-          <p:cNvPr id="178" name="coverage-not-quality-white.png"/>
+          <p:cNvPr id="176" name="coverage-not-quality-white.png"/>
           <p:cNvPicPr>
             <a:picLocks noChangeAspect="1"/>
           </p:cNvPicPr>
@@ -3917,7 +3853,7 @@
       </p:grpSpPr>
       <p:sp>
         <p:nvSpPr>
-          <p:cNvPr id="180" name="Shape 180"/>
+          <p:cNvPr id="178" name="Shape 178"/>
           <p:cNvSpPr/>
           <p:nvPr>
             <p:ph type="title"/>
@@ -3941,7 +3877,7 @@
       </p:sp>
       <p:sp>
         <p:nvSpPr>
-          <p:cNvPr id="181" name="Shape 181"/>
+          <p:cNvPr id="179" name="Shape 179"/>
           <p:cNvSpPr/>
           <p:nvPr/>
         </p:nvSpPr>
@@ -4010,7 +3946,7 @@
       </p:sp>
       <p:sp>
         <p:nvSpPr>
-          <p:cNvPr id="182" name="Shape 182"/>
+          <p:cNvPr id="180" name="Shape 180"/>
           <p:cNvSpPr/>
           <p:nvPr/>
         </p:nvSpPr>
@@ -4046,7 +3982,7 @@
       </p:sp>
       <p:sp>
         <p:nvSpPr>
-          <p:cNvPr id="183" name="Shape 183"/>
+          <p:cNvPr id="181" name="Shape 181"/>
           <p:cNvSpPr/>
           <p:nvPr/>
         </p:nvSpPr>
@@ -4141,7 +4077,7 @@
       </p:grpSpPr>
       <p:sp>
         <p:nvSpPr>
-          <p:cNvPr id="185" name="Shape 185"/>
+          <p:cNvPr id="183" name="Shape 183"/>
           <p:cNvSpPr/>
           <p:nvPr>
             <p:ph type="title"/>
@@ -4165,7 +4101,7 @@
       </p:sp>
       <p:sp>
         <p:nvSpPr>
-          <p:cNvPr id="186" name="Shape 186"/>
+          <p:cNvPr id="184" name="Shape 184"/>
           <p:cNvSpPr/>
           <p:nvPr>
             <p:ph type="body" sz="quarter" idx="1"/>
@@ -4199,7 +4135,7 @@
       </p:sp>
       <p:sp>
         <p:nvSpPr>
-          <p:cNvPr id="187" name="Shape 187"/>
+          <p:cNvPr id="185" name="Shape 185"/>
           <p:cNvSpPr/>
           <p:nvPr/>
         </p:nvSpPr>
@@ -4261,7 +4197,7 @@
       </p:grpSpPr>
       <p:sp>
         <p:nvSpPr>
-          <p:cNvPr id="189" name="Shape 189"/>
+          <p:cNvPr id="187" name="Shape 187"/>
           <p:cNvSpPr/>
           <p:nvPr>
             <p:ph type="title"/>
@@ -4285,7 +4221,7 @@
       </p:sp>
       <p:sp>
         <p:nvSpPr>
-          <p:cNvPr id="190" name="Shape 190"/>
+          <p:cNvPr id="188" name="Shape 188"/>
           <p:cNvSpPr/>
           <p:nvPr>
             <p:ph type="body" sz="quarter" idx="1"/>
@@ -4362,7 +4298,7 @@
       </p:sp>
       <p:sp>
         <p:nvSpPr>
-          <p:cNvPr id="191" name="Shape 191"/>
+          <p:cNvPr id="189" name="Shape 189"/>
           <p:cNvSpPr/>
           <p:nvPr/>
         </p:nvSpPr>
@@ -4424,7 +4360,7 @@
       </p:grpSpPr>
       <p:sp>
         <p:nvSpPr>
-          <p:cNvPr id="193" name="Shape 193"/>
+          <p:cNvPr id="191" name="Shape 191"/>
           <p:cNvSpPr/>
           <p:nvPr>
             <p:ph type="title"/>
@@ -4456,7 +4392,7 @@
       </p:sp>
       <p:sp>
         <p:nvSpPr>
-          <p:cNvPr id="194" name="Shape 194"/>
+          <p:cNvPr id="192" name="Shape 192"/>
           <p:cNvSpPr/>
           <p:nvPr>
             <p:ph type="body" sz="half" idx="1"/>
@@ -4570,7 +4506,7 @@
       </p:grpSpPr>
       <p:sp>
         <p:nvSpPr>
-          <p:cNvPr id="196" name="Shape 196"/>
+          <p:cNvPr id="194" name="Shape 194"/>
           <p:cNvSpPr/>
           <p:nvPr>
             <p:ph type="title"/>
@@ -4602,7 +4538,7 @@
       </p:sp>
       <p:sp>
         <p:nvSpPr>
-          <p:cNvPr id="197" name="Shape 197"/>
+          <p:cNvPr id="195" name="Shape 195"/>
           <p:cNvSpPr/>
           <p:nvPr/>
         </p:nvSpPr>

</xml_diff>